<commit_message>
ppt still shows and is tracked but will not be uploaded inthe repo??
</commit_message>
<xml_diff>
--- a/Notes/School Master.pptx
+++ b/Notes/School Master.pptx
@@ -111,6 +111,11 @@
       </a:defRPr>
     </a:lvl9pPr>
   </p:defaultTextStyle>
+  <p:extLst>
+    <p:ext uri="{EFAFB233-063F-42B5-8137-9DF3F51BA10A}">
+      <p15:sldGuideLst xmlns:p15="http://schemas.microsoft.com/office/powerpoint/2012/main"/>
+    </p:ext>
+  </p:extLst>
 </p:presentation>
 </file>
 
@@ -196,7 +201,7 @@
           <a:p>
             <a:fld id="{14FE9085-5457-4BBA-858E-5A486D639742}" type="datetimeFigureOut">
               <a:rPr lang="en-CA" smtClean="0"/>
-              <a:t>2023-07-24</a:t>
+              <a:t>2023-07-27</a:t>
             </a:fld>
             <a:endParaRPr lang="en-CA"/>
           </a:p>
@@ -1762,7 +1767,7 @@
           <a:p>
             <a:fld id="{81DD7A3B-2931-470C-930B-ABA4772AAA6B}" type="datetimeFigureOut">
               <a:rPr lang="en-CA" smtClean="0"/>
-              <a:t>2023-07-24</a:t>
+              <a:t>2023-07-27</a:t>
             </a:fld>
             <a:endParaRPr lang="en-CA"/>
           </a:p>
@@ -1962,7 +1967,7 @@
           <a:p>
             <a:fld id="{81DD7A3B-2931-470C-930B-ABA4772AAA6B}" type="datetimeFigureOut">
               <a:rPr lang="en-CA" smtClean="0"/>
-              <a:t>2023-07-24</a:t>
+              <a:t>2023-07-27</a:t>
             </a:fld>
             <a:endParaRPr lang="en-CA"/>
           </a:p>
@@ -2172,7 +2177,7 @@
           <a:p>
             <a:fld id="{81DD7A3B-2931-470C-930B-ABA4772AAA6B}" type="datetimeFigureOut">
               <a:rPr lang="en-CA" smtClean="0"/>
-              <a:t>2023-07-24</a:t>
+              <a:t>2023-07-27</a:t>
             </a:fld>
             <a:endParaRPr lang="en-CA"/>
           </a:p>
@@ -2372,7 +2377,7 @@
           <a:p>
             <a:fld id="{81DD7A3B-2931-470C-930B-ABA4772AAA6B}" type="datetimeFigureOut">
               <a:rPr lang="en-CA" smtClean="0"/>
-              <a:t>2023-07-24</a:t>
+              <a:t>2023-07-27</a:t>
             </a:fld>
             <a:endParaRPr lang="en-CA"/>
           </a:p>
@@ -2648,7 +2653,7 @@
           <a:p>
             <a:fld id="{81DD7A3B-2931-470C-930B-ABA4772AAA6B}" type="datetimeFigureOut">
               <a:rPr lang="en-CA" smtClean="0"/>
-              <a:t>2023-07-24</a:t>
+              <a:t>2023-07-27</a:t>
             </a:fld>
             <a:endParaRPr lang="en-CA"/>
           </a:p>
@@ -2916,7 +2921,7 @@
           <a:p>
             <a:fld id="{81DD7A3B-2931-470C-930B-ABA4772AAA6B}" type="datetimeFigureOut">
               <a:rPr lang="en-CA" smtClean="0"/>
-              <a:t>2023-07-24</a:t>
+              <a:t>2023-07-27</a:t>
             </a:fld>
             <a:endParaRPr lang="en-CA"/>
           </a:p>
@@ -3331,7 +3336,7 @@
           <a:p>
             <a:fld id="{81DD7A3B-2931-470C-930B-ABA4772AAA6B}" type="datetimeFigureOut">
               <a:rPr lang="en-CA" smtClean="0"/>
-              <a:t>2023-07-24</a:t>
+              <a:t>2023-07-27</a:t>
             </a:fld>
             <a:endParaRPr lang="en-CA"/>
           </a:p>
@@ -3473,7 +3478,7 @@
           <a:p>
             <a:fld id="{81DD7A3B-2931-470C-930B-ABA4772AAA6B}" type="datetimeFigureOut">
               <a:rPr lang="en-CA" smtClean="0"/>
-              <a:t>2023-07-24</a:t>
+              <a:t>2023-07-27</a:t>
             </a:fld>
             <a:endParaRPr lang="en-CA"/>
           </a:p>
@@ -3586,7 +3591,7 @@
           <a:p>
             <a:fld id="{81DD7A3B-2931-470C-930B-ABA4772AAA6B}" type="datetimeFigureOut">
               <a:rPr lang="en-CA" smtClean="0"/>
-              <a:t>2023-07-24</a:t>
+              <a:t>2023-07-27</a:t>
             </a:fld>
             <a:endParaRPr lang="en-CA"/>
           </a:p>
@@ -3899,7 +3904,7 @@
           <a:p>
             <a:fld id="{81DD7A3B-2931-470C-930B-ABA4772AAA6B}" type="datetimeFigureOut">
               <a:rPr lang="en-CA" smtClean="0"/>
-              <a:t>2023-07-24</a:t>
+              <a:t>2023-07-27</a:t>
             </a:fld>
             <a:endParaRPr lang="en-CA"/>
           </a:p>
@@ -4188,7 +4193,7 @@
           <a:p>
             <a:fld id="{81DD7A3B-2931-470C-930B-ABA4772AAA6B}" type="datetimeFigureOut">
               <a:rPr lang="en-CA" smtClean="0"/>
-              <a:t>2023-07-24</a:t>
+              <a:t>2023-07-27</a:t>
             </a:fld>
             <a:endParaRPr lang="en-CA"/>
           </a:p>
@@ -4431,7 +4436,7 @@
           <a:p>
             <a:fld id="{81DD7A3B-2931-470C-930B-ABA4772AAA6B}" type="datetimeFigureOut">
               <a:rPr lang="en-CA" smtClean="0"/>
-              <a:t>2023-07-24</a:t>
+              <a:t>2023-07-27</a:t>
             </a:fld>
             <a:endParaRPr lang="en-CA"/>
           </a:p>
@@ -6046,7 +6051,7 @@
         </p:nvSpPr>
         <p:spPr>
           <a:xfrm>
-            <a:off x="3789678" y="1548912"/>
+            <a:off x="3789678" y="1568164"/>
             <a:ext cx="7804010" cy="3721672"/>
           </a:xfrm>
           <a:prstGeom prst="rect">
@@ -6071,26 +6076,351 @@
           <a:bodyPr numCol="1" rtlCol="0" anchor="ctr"/>
           <a:lstStyle/>
           <a:p>
-            <a:r>
-              <a:rPr lang="en-CA" dirty="0"/>
-              <a:t>Bunch of </a:t>
-            </a:r>
-            <a:r>
-              <a:rPr lang="en-CA" dirty="0" err="1"/>
-              <a:t>api</a:t>
-            </a:r>
-            <a:r>
-              <a:rPr lang="en-CA" dirty="0"/>
-              <a:t> calls to the server to facilitate student user</a:t>
-            </a:r>
-          </a:p>
-          <a:p>
             <a:endParaRPr lang="en-CA" dirty="0"/>
           </a:p>
-          <a:p>
-            <a:r>
-              <a:rPr lang="en-CA" dirty="0"/>
-              <a:t>What is the main thing that the Student is going to do? We need to focus on that…</a:t>
+        </p:txBody>
+      </p:sp>
+      <p:sp>
+        <p:nvSpPr>
+          <p:cNvPr id="3" name="Rectangle: Rounded Corners 2">
+            <a:extLst>
+              <a:ext uri="{FF2B5EF4-FFF2-40B4-BE49-F238E27FC236}">
+                <a16:creationId xmlns:a16="http://schemas.microsoft.com/office/drawing/2014/main" id="{568FB621-4D8A-B764-4D07-FC4771E68AC2}"/>
+              </a:ext>
+            </a:extLst>
+          </p:cNvPr>
+          <p:cNvSpPr/>
+          <p:nvPr/>
+        </p:nvSpPr>
+        <p:spPr>
+          <a:xfrm>
+            <a:off x="4441372" y="1983377"/>
+            <a:ext cx="1140823" cy="330926"/>
+          </a:xfrm>
+          <a:prstGeom prst="roundRect">
+            <a:avLst/>
+          </a:prstGeom>
+        </p:spPr>
+        <p:style>
+          <a:lnRef idx="2">
+            <a:schemeClr val="accent2"/>
+          </a:lnRef>
+          <a:fillRef idx="1">
+            <a:schemeClr val="lt1"/>
+          </a:fillRef>
+          <a:effectRef idx="0">
+            <a:schemeClr val="accent2"/>
+          </a:effectRef>
+          <a:fontRef idx="minor">
+            <a:schemeClr val="dk1"/>
+          </a:fontRef>
+        </p:style>
+        <p:txBody>
+          <a:bodyPr rtlCol="0" anchor="ctr"/>
+          <a:lstStyle/>
+          <a:p>
+            <a:pPr algn="ctr"/>
+            <a:r>
+              <a:rPr lang="en-CA" sz="1600" dirty="0"/>
+              <a:t>Edit profile</a:t>
+            </a:r>
+          </a:p>
+        </p:txBody>
+      </p:sp>
+      <p:graphicFrame>
+        <p:nvGraphicFramePr>
+          <p:cNvPr id="4" name="Table 4">
+            <a:extLst>
+              <a:ext uri="{FF2B5EF4-FFF2-40B4-BE49-F238E27FC236}">
+                <a16:creationId xmlns:a16="http://schemas.microsoft.com/office/drawing/2014/main" id="{E52D61A0-7259-381C-A669-20C4B52A52E3}"/>
+              </a:ext>
+            </a:extLst>
+          </p:cNvPr>
+          <p:cNvGraphicFramePr>
+            <a:graphicFrameLocks noGrp="1"/>
+          </p:cNvGraphicFramePr>
+          <p:nvPr>
+            <p:extLst>
+              <p:ext uri="{D42A27DB-BD31-4B8C-83A1-F6EECF244321}">
+                <p14:modId xmlns:p14="http://schemas.microsoft.com/office/powerpoint/2010/main" val="1609871902"/>
+              </p:ext>
+            </p:extLst>
+          </p:nvPr>
+        </p:nvGraphicFramePr>
+        <p:xfrm>
+          <a:off x="6019073" y="1859280"/>
+          <a:ext cx="5423991" cy="579120"/>
+        </p:xfrm>
+        <a:graphic>
+          <a:graphicData uri="http://schemas.openxmlformats.org/drawingml/2006/table">
+            <a:tbl>
+              <a:tblPr firstRow="1" bandRow="1">
+                <a:tableStyleId>{C4B1156A-380E-4F78-BDF5-A606A8083BF9}</a:tableStyleId>
+              </a:tblPr>
+              <a:tblGrid>
+                <a:gridCol w="1056348">
+                  <a:extLst>
+                    <a:ext uri="{9D8B030D-6E8A-4147-A177-3AD203B41FA5}">
+                      <a16:colId xmlns:a16="http://schemas.microsoft.com/office/drawing/2014/main" val="1977723658"/>
+                    </a:ext>
+                  </a:extLst>
+                </a:gridCol>
+                <a:gridCol w="1056348">
+                  <a:extLst>
+                    <a:ext uri="{9D8B030D-6E8A-4147-A177-3AD203B41FA5}">
+                      <a16:colId xmlns:a16="http://schemas.microsoft.com/office/drawing/2014/main" val="3731825694"/>
+                    </a:ext>
+                  </a:extLst>
+                </a:gridCol>
+                <a:gridCol w="1056348">
+                  <a:extLst>
+                    <a:ext uri="{9D8B030D-6E8A-4147-A177-3AD203B41FA5}">
+                      <a16:colId xmlns:a16="http://schemas.microsoft.com/office/drawing/2014/main" val="2915539679"/>
+                    </a:ext>
+                  </a:extLst>
+                </a:gridCol>
+                <a:gridCol w="1403539">
+                  <a:extLst>
+                    <a:ext uri="{9D8B030D-6E8A-4147-A177-3AD203B41FA5}">
+                      <a16:colId xmlns:a16="http://schemas.microsoft.com/office/drawing/2014/main" val="3947593428"/>
+                    </a:ext>
+                  </a:extLst>
+                </a:gridCol>
+                <a:gridCol w="851408">
+                  <a:extLst>
+                    <a:ext uri="{9D8B030D-6E8A-4147-A177-3AD203B41FA5}">
+                      <a16:colId xmlns:a16="http://schemas.microsoft.com/office/drawing/2014/main" val="3963005587"/>
+                    </a:ext>
+                  </a:extLst>
+                </a:gridCol>
+              </a:tblGrid>
+              <a:tr h="127847">
+                <a:tc>
+                  <a:txBody>
+                    <a:bodyPr/>
+                    <a:lstStyle/>
+                    <a:p>
+                      <a:r>
+                        <a:rPr lang="en-CA" sz="1200" dirty="0"/>
+                        <a:t>Full Name</a:t>
+                      </a:r>
+                    </a:p>
+                  </a:txBody>
+                  <a:tcPr/>
+                </a:tc>
+                <a:tc>
+                  <a:txBody>
+                    <a:bodyPr/>
+                    <a:lstStyle/>
+                    <a:p>
+                      <a:r>
+                        <a:rPr lang="en-CA" sz="1200" dirty="0"/>
+                        <a:t>Email</a:t>
+                      </a:r>
+                    </a:p>
+                  </a:txBody>
+                  <a:tcPr/>
+                </a:tc>
+                <a:tc>
+                  <a:txBody>
+                    <a:bodyPr/>
+                    <a:lstStyle/>
+                    <a:p>
+                      <a:r>
+                        <a:rPr lang="en-CA" sz="1200" dirty="0"/>
+                        <a:t>Phone</a:t>
+                      </a:r>
+                    </a:p>
+                  </a:txBody>
+                  <a:tcPr/>
+                </a:tc>
+                <a:tc>
+                  <a:txBody>
+                    <a:bodyPr/>
+                    <a:lstStyle/>
+                    <a:p>
+                      <a:r>
+                        <a:rPr lang="en-CA" sz="1200" dirty="0"/>
+                        <a:t>Emergency Contact</a:t>
+                      </a:r>
+                    </a:p>
+                  </a:txBody>
+                  <a:tcPr/>
+                </a:tc>
+                <a:tc>
+                  <a:txBody>
+                    <a:bodyPr/>
+                    <a:lstStyle/>
+                    <a:p>
+                      <a:r>
+                        <a:rPr lang="en-CA" sz="1200" dirty="0"/>
+                        <a:t>GPA</a:t>
+                      </a:r>
+                    </a:p>
+                  </a:txBody>
+                  <a:tcPr/>
+                </a:tc>
+                <a:extLst>
+                  <a:ext uri="{0D108BD9-81ED-4DB2-BD59-A6C34878D82A}">
+                    <a16:rowId xmlns:a16="http://schemas.microsoft.com/office/drawing/2014/main" val="1416757127"/>
+                  </a:ext>
+                </a:extLst>
+              </a:tr>
+              <a:tr h="127847">
+                <a:tc>
+                  <a:txBody>
+                    <a:bodyPr/>
+                    <a:lstStyle/>
+                    <a:p>
+                      <a:endParaRPr lang="en-CA" sz="1400"/>
+                    </a:p>
+                  </a:txBody>
+                  <a:tcPr/>
+                </a:tc>
+                <a:tc>
+                  <a:txBody>
+                    <a:bodyPr/>
+                    <a:lstStyle/>
+                    <a:p>
+                      <a:endParaRPr lang="en-CA" sz="1400"/>
+                    </a:p>
+                  </a:txBody>
+                  <a:tcPr/>
+                </a:tc>
+                <a:tc>
+                  <a:txBody>
+                    <a:bodyPr/>
+                    <a:lstStyle/>
+                    <a:p>
+                      <a:endParaRPr lang="en-CA" sz="1400"/>
+                    </a:p>
+                  </a:txBody>
+                  <a:tcPr/>
+                </a:tc>
+                <a:tc>
+                  <a:txBody>
+                    <a:bodyPr/>
+                    <a:lstStyle/>
+                    <a:p>
+                      <a:endParaRPr lang="en-CA" sz="1400" dirty="0"/>
+                    </a:p>
+                  </a:txBody>
+                  <a:tcPr/>
+                </a:tc>
+                <a:tc>
+                  <a:txBody>
+                    <a:bodyPr/>
+                    <a:lstStyle/>
+                    <a:p>
+                      <a:endParaRPr lang="en-CA" sz="1400" dirty="0"/>
+                    </a:p>
+                  </a:txBody>
+                  <a:tcPr/>
+                </a:tc>
+                <a:extLst>
+                  <a:ext uri="{0D108BD9-81ED-4DB2-BD59-A6C34878D82A}">
+                    <a16:rowId xmlns:a16="http://schemas.microsoft.com/office/drawing/2014/main" val="3727995775"/>
+                  </a:ext>
+                </a:extLst>
+              </a:tr>
+            </a:tbl>
+          </a:graphicData>
+        </a:graphic>
+      </p:graphicFrame>
+      <p:sp>
+        <p:nvSpPr>
+          <p:cNvPr id="5" name="TextBox 4">
+            <a:extLst>
+              <a:ext uri="{FF2B5EF4-FFF2-40B4-BE49-F238E27FC236}">
+                <a16:creationId xmlns:a16="http://schemas.microsoft.com/office/drawing/2014/main" id="{01D99DD7-A551-37D0-8415-6AF2D83A9CE1}"/>
+              </a:ext>
+            </a:extLst>
+          </p:cNvPr>
+          <p:cNvSpPr txBox="1"/>
+          <p:nvPr/>
+        </p:nvSpPr>
+        <p:spPr>
+          <a:xfrm>
+            <a:off x="4376057" y="2921911"/>
+            <a:ext cx="2669177" cy="2062103"/>
+          </a:xfrm>
+          <a:prstGeom prst="rect">
+            <a:avLst/>
+          </a:prstGeom>
+        </p:spPr>
+        <p:style>
+          <a:lnRef idx="2">
+            <a:schemeClr val="accent1"/>
+          </a:lnRef>
+          <a:fillRef idx="1">
+            <a:schemeClr val="lt1"/>
+          </a:fillRef>
+          <a:effectRef idx="0">
+            <a:schemeClr val="accent1"/>
+          </a:effectRef>
+          <a:fontRef idx="minor">
+            <a:schemeClr val="dk1"/>
+          </a:fontRef>
+        </p:style>
+        <p:txBody>
+          <a:bodyPr wrap="square" rtlCol="0">
+            <a:spAutoFit/>
+          </a:bodyPr>
+          <a:lstStyle/>
+          <a:p>
+            <a:r>
+              <a:rPr lang="en-CA" sz="1600" b="1" dirty="0"/>
+              <a:t>Courses enrolled: </a:t>
+            </a:r>
+          </a:p>
+          <a:p>
+            <a:r>
+              <a:rPr lang="en-CA" sz="1600" dirty="0"/>
+              <a:t>&lt;</a:t>
+            </a:r>
+            <a:r>
+              <a:rPr lang="en-CA" sz="1600" dirty="0" err="1"/>
+              <a:t>ul</a:t>
+            </a:r>
+            <a:r>
+              <a:rPr lang="en-CA" sz="1600" dirty="0"/>
+              <a:t>&gt;</a:t>
+            </a:r>
+          </a:p>
+          <a:p>
+            <a:r>
+              <a:rPr lang="en-CA" sz="1600" dirty="0"/>
+              <a:t>+ Academic semester</a:t>
+            </a:r>
+          </a:p>
+          <a:p>
+            <a:r>
+              <a:rPr lang="en-CA" sz="1600" dirty="0"/>
+              <a:t>	&lt;li&gt;courses&lt;/li&gt;</a:t>
+            </a:r>
+          </a:p>
+          <a:p>
+            <a:r>
+              <a:rPr lang="en-CA" sz="1600" dirty="0"/>
+              <a:t>+ Academic semester</a:t>
+            </a:r>
+          </a:p>
+          <a:p>
+            <a:r>
+              <a:rPr lang="en-CA" sz="1600" dirty="0"/>
+              <a:t>	&lt;li&gt;courses&lt;/li&gt;</a:t>
+            </a:r>
+          </a:p>
+          <a:p>
+            <a:r>
+              <a:rPr lang="en-CA" sz="1600" dirty="0"/>
+              <a:t>+ Academic semester</a:t>
+            </a:r>
+          </a:p>
+          <a:p>
+            <a:r>
+              <a:rPr lang="en-CA" sz="1600" dirty="0"/>
+              <a:t>	&lt;li&gt;courses&lt;/li&gt;</a:t>
             </a:r>
           </a:p>
         </p:txBody>
@@ -6550,26 +6880,372 @@
           <a:bodyPr numCol="1" rtlCol="0" anchor="ctr"/>
           <a:lstStyle/>
           <a:p>
-            <a:r>
-              <a:rPr lang="en-CA" dirty="0"/>
-              <a:t>Bunch of </a:t>
-            </a:r>
-            <a:r>
-              <a:rPr lang="en-CA" dirty="0" err="1"/>
-              <a:t>api</a:t>
-            </a:r>
-            <a:r>
-              <a:rPr lang="en-CA" dirty="0"/>
-              <a:t> calls to the server to facilitate faculty user</a:t>
-            </a:r>
-          </a:p>
-          <a:p>
             <a:endParaRPr lang="en-CA" dirty="0"/>
           </a:p>
           <a:p>
-            <a:r>
-              <a:rPr lang="en-CA" dirty="0"/>
-              <a:t>What is the main thing that the Faculty is going to do? We need to focus on that…</a:t>
+            <a:endParaRPr lang="en-CA" dirty="0"/>
+          </a:p>
+          <a:p>
+            <a:endParaRPr lang="en-CA" dirty="0"/>
+          </a:p>
+          <a:p>
+            <a:endParaRPr lang="en-CA" dirty="0"/>
+          </a:p>
+          <a:p>
+            <a:endParaRPr lang="en-CA" dirty="0"/>
+          </a:p>
+          <a:p>
+            <a:endParaRPr lang="en-CA" dirty="0"/>
+          </a:p>
+          <a:p>
+            <a:endParaRPr lang="en-CA" dirty="0"/>
+          </a:p>
+          <a:p>
+            <a:endParaRPr lang="en-CA" dirty="0"/>
+          </a:p>
+        </p:txBody>
+      </p:sp>
+      <p:sp>
+        <p:nvSpPr>
+          <p:cNvPr id="3" name="Rectangle: Rounded Corners 2">
+            <a:extLst>
+              <a:ext uri="{FF2B5EF4-FFF2-40B4-BE49-F238E27FC236}">
+                <a16:creationId xmlns:a16="http://schemas.microsoft.com/office/drawing/2014/main" id="{0AD2FBD1-F0B7-B047-69C2-08C54A6EA88F}"/>
+              </a:ext>
+            </a:extLst>
+          </p:cNvPr>
+          <p:cNvSpPr/>
+          <p:nvPr/>
+        </p:nvSpPr>
+        <p:spPr>
+          <a:xfrm>
+            <a:off x="4441372" y="1983377"/>
+            <a:ext cx="1140823" cy="330926"/>
+          </a:xfrm>
+          <a:prstGeom prst="roundRect">
+            <a:avLst/>
+          </a:prstGeom>
+        </p:spPr>
+        <p:style>
+          <a:lnRef idx="2">
+            <a:schemeClr val="accent2"/>
+          </a:lnRef>
+          <a:fillRef idx="1">
+            <a:schemeClr val="lt1"/>
+          </a:fillRef>
+          <a:effectRef idx="0">
+            <a:schemeClr val="accent2"/>
+          </a:effectRef>
+          <a:fontRef idx="minor">
+            <a:schemeClr val="dk1"/>
+          </a:fontRef>
+        </p:style>
+        <p:txBody>
+          <a:bodyPr rtlCol="0" anchor="ctr"/>
+          <a:lstStyle/>
+          <a:p>
+            <a:pPr algn="ctr"/>
+            <a:r>
+              <a:rPr lang="en-CA" sz="1600" dirty="0"/>
+              <a:t>Edit profile</a:t>
+            </a:r>
+          </a:p>
+        </p:txBody>
+      </p:sp>
+      <p:graphicFrame>
+        <p:nvGraphicFramePr>
+          <p:cNvPr id="4" name="Table 4">
+            <a:extLst>
+              <a:ext uri="{FF2B5EF4-FFF2-40B4-BE49-F238E27FC236}">
+                <a16:creationId xmlns:a16="http://schemas.microsoft.com/office/drawing/2014/main" id="{35CC7235-6059-934D-EF07-5D82866F19C5}"/>
+              </a:ext>
+            </a:extLst>
+          </p:cNvPr>
+          <p:cNvGraphicFramePr>
+            <a:graphicFrameLocks noGrp="1"/>
+          </p:cNvGraphicFramePr>
+          <p:nvPr>
+            <p:extLst>
+              <p:ext uri="{D42A27DB-BD31-4B8C-83A1-F6EECF244321}">
+                <p14:modId xmlns:p14="http://schemas.microsoft.com/office/powerpoint/2010/main" val="3170794933"/>
+              </p:ext>
+            </p:extLst>
+          </p:nvPr>
+        </p:nvGraphicFramePr>
+        <p:xfrm>
+          <a:off x="6834780" y="1859280"/>
+          <a:ext cx="4216397" cy="579120"/>
+        </p:xfrm>
+        <a:graphic>
+          <a:graphicData uri="http://schemas.openxmlformats.org/drawingml/2006/table">
+            <a:tbl>
+              <a:tblPr firstRow="1" bandRow="1">
+                <a:tableStyleId>{C4B1156A-380E-4F78-BDF5-A606A8083BF9}</a:tableStyleId>
+              </a:tblPr>
+              <a:tblGrid>
+                <a:gridCol w="821163">
+                  <a:extLst>
+                    <a:ext uri="{9D8B030D-6E8A-4147-A177-3AD203B41FA5}">
+                      <a16:colId xmlns:a16="http://schemas.microsoft.com/office/drawing/2014/main" val="1977723658"/>
+                    </a:ext>
+                  </a:extLst>
+                </a:gridCol>
+                <a:gridCol w="821163">
+                  <a:extLst>
+                    <a:ext uri="{9D8B030D-6E8A-4147-A177-3AD203B41FA5}">
+                      <a16:colId xmlns:a16="http://schemas.microsoft.com/office/drawing/2014/main" val="3731825694"/>
+                    </a:ext>
+                  </a:extLst>
+                </a:gridCol>
+                <a:gridCol w="821163">
+                  <a:extLst>
+                    <a:ext uri="{9D8B030D-6E8A-4147-A177-3AD203B41FA5}">
+                      <a16:colId xmlns:a16="http://schemas.microsoft.com/office/drawing/2014/main" val="2915539679"/>
+                    </a:ext>
+                  </a:extLst>
+                </a:gridCol>
+                <a:gridCol w="1091057">
+                  <a:extLst>
+                    <a:ext uri="{9D8B030D-6E8A-4147-A177-3AD203B41FA5}">
+                      <a16:colId xmlns:a16="http://schemas.microsoft.com/office/drawing/2014/main" val="3947593428"/>
+                    </a:ext>
+                  </a:extLst>
+                </a:gridCol>
+                <a:gridCol w="661851">
+                  <a:extLst>
+                    <a:ext uri="{9D8B030D-6E8A-4147-A177-3AD203B41FA5}">
+                      <a16:colId xmlns:a16="http://schemas.microsoft.com/office/drawing/2014/main" val="3963005587"/>
+                    </a:ext>
+                  </a:extLst>
+                </a:gridCol>
+              </a:tblGrid>
+              <a:tr h="127847">
+                <a:tc>
+                  <a:txBody>
+                    <a:bodyPr/>
+                    <a:lstStyle/>
+                    <a:p>
+                      <a:r>
+                        <a:rPr lang="en-CA" sz="1200" dirty="0"/>
+                        <a:t>Full Name</a:t>
+                      </a:r>
+                    </a:p>
+                  </a:txBody>
+                  <a:tcPr/>
+                </a:tc>
+                <a:tc>
+                  <a:txBody>
+                    <a:bodyPr/>
+                    <a:lstStyle/>
+                    <a:p>
+                      <a:r>
+                        <a:rPr lang="en-CA" sz="1200" dirty="0"/>
+                        <a:t>Email</a:t>
+                      </a:r>
+                    </a:p>
+                  </a:txBody>
+                  <a:tcPr/>
+                </a:tc>
+                <a:tc>
+                  <a:txBody>
+                    <a:bodyPr/>
+                    <a:lstStyle/>
+                    <a:p>
+                      <a:r>
+                        <a:rPr lang="en-CA" sz="1200" dirty="0"/>
+                        <a:t>Phone</a:t>
+                      </a:r>
+                    </a:p>
+                  </a:txBody>
+                  <a:tcPr/>
+                </a:tc>
+                <a:tc>
+                  <a:txBody>
+                    <a:bodyPr/>
+                    <a:lstStyle/>
+                    <a:p>
+                      <a:r>
+                        <a:rPr lang="en-CA" sz="1200" dirty="0"/>
+                        <a:t>Department</a:t>
+                      </a:r>
+                    </a:p>
+                  </a:txBody>
+                  <a:tcPr/>
+                </a:tc>
+                <a:tc>
+                  <a:txBody>
+                    <a:bodyPr/>
+                    <a:lstStyle/>
+                    <a:p>
+                      <a:r>
+                        <a:rPr lang="en-CA" sz="1200" dirty="0"/>
+                        <a:t>qual</a:t>
+                      </a:r>
+                    </a:p>
+                  </a:txBody>
+                  <a:tcPr/>
+                </a:tc>
+                <a:extLst>
+                  <a:ext uri="{0D108BD9-81ED-4DB2-BD59-A6C34878D82A}">
+                    <a16:rowId xmlns:a16="http://schemas.microsoft.com/office/drawing/2014/main" val="1416757127"/>
+                  </a:ext>
+                </a:extLst>
+              </a:tr>
+              <a:tr h="127847">
+                <a:tc>
+                  <a:txBody>
+                    <a:bodyPr/>
+                    <a:lstStyle/>
+                    <a:p>
+                      <a:endParaRPr lang="en-CA" sz="1400"/>
+                    </a:p>
+                  </a:txBody>
+                  <a:tcPr/>
+                </a:tc>
+                <a:tc>
+                  <a:txBody>
+                    <a:bodyPr/>
+                    <a:lstStyle/>
+                    <a:p>
+                      <a:endParaRPr lang="en-CA" sz="1400"/>
+                    </a:p>
+                  </a:txBody>
+                  <a:tcPr/>
+                </a:tc>
+                <a:tc>
+                  <a:txBody>
+                    <a:bodyPr/>
+                    <a:lstStyle/>
+                    <a:p>
+                      <a:endParaRPr lang="en-CA" sz="1400"/>
+                    </a:p>
+                  </a:txBody>
+                  <a:tcPr/>
+                </a:tc>
+                <a:tc>
+                  <a:txBody>
+                    <a:bodyPr/>
+                    <a:lstStyle/>
+                    <a:p>
+                      <a:endParaRPr lang="en-CA" sz="1400" dirty="0"/>
+                    </a:p>
+                  </a:txBody>
+                  <a:tcPr/>
+                </a:tc>
+                <a:tc>
+                  <a:txBody>
+                    <a:bodyPr/>
+                    <a:lstStyle/>
+                    <a:p>
+                      <a:endParaRPr lang="en-CA" sz="1400" dirty="0"/>
+                    </a:p>
+                  </a:txBody>
+                  <a:tcPr/>
+                </a:tc>
+                <a:extLst>
+                  <a:ext uri="{0D108BD9-81ED-4DB2-BD59-A6C34878D82A}">
+                    <a16:rowId xmlns:a16="http://schemas.microsoft.com/office/drawing/2014/main" val="3727995775"/>
+                  </a:ext>
+                </a:extLst>
+              </a:tr>
+            </a:tbl>
+          </a:graphicData>
+        </a:graphic>
+      </p:graphicFrame>
+      <p:sp>
+        <p:nvSpPr>
+          <p:cNvPr id="6" name="TextBox 5">
+            <a:extLst>
+              <a:ext uri="{FF2B5EF4-FFF2-40B4-BE49-F238E27FC236}">
+                <a16:creationId xmlns:a16="http://schemas.microsoft.com/office/drawing/2014/main" id="{4FF205EC-3D6B-74B9-1F4E-3D751E571CDB}"/>
+              </a:ext>
+            </a:extLst>
+          </p:cNvPr>
+          <p:cNvSpPr txBox="1"/>
+          <p:nvPr/>
+        </p:nvSpPr>
+        <p:spPr>
+          <a:xfrm>
+            <a:off x="4376057" y="2921911"/>
+            <a:ext cx="2669177" cy="2062103"/>
+          </a:xfrm>
+          <a:prstGeom prst="rect">
+            <a:avLst/>
+          </a:prstGeom>
+        </p:spPr>
+        <p:style>
+          <a:lnRef idx="2">
+            <a:schemeClr val="accent1"/>
+          </a:lnRef>
+          <a:fillRef idx="1">
+            <a:schemeClr val="lt1"/>
+          </a:fillRef>
+          <a:effectRef idx="0">
+            <a:schemeClr val="accent1"/>
+          </a:effectRef>
+          <a:fontRef idx="minor">
+            <a:schemeClr val="dk1"/>
+          </a:fontRef>
+        </p:style>
+        <p:txBody>
+          <a:bodyPr wrap="square" rtlCol="0">
+            <a:spAutoFit/>
+          </a:bodyPr>
+          <a:lstStyle/>
+          <a:p>
+            <a:r>
+              <a:rPr lang="en-CA" sz="1600" b="1" dirty="0"/>
+              <a:t>Courses teaching: </a:t>
+            </a:r>
+          </a:p>
+          <a:p>
+            <a:r>
+              <a:rPr lang="en-CA" sz="1600" dirty="0"/>
+              <a:t>&lt;</a:t>
+            </a:r>
+            <a:r>
+              <a:rPr lang="en-CA" sz="1600" dirty="0" err="1"/>
+              <a:t>ul</a:t>
+            </a:r>
+            <a:r>
+              <a:rPr lang="en-CA" sz="1600" dirty="0"/>
+              <a:t>&gt;</a:t>
+            </a:r>
+          </a:p>
+          <a:p>
+            <a:r>
+              <a:rPr lang="en-CA" sz="1600" dirty="0"/>
+              <a:t>+ Academic semester</a:t>
+            </a:r>
+          </a:p>
+          <a:p>
+            <a:r>
+              <a:rPr lang="en-CA" sz="1600" dirty="0"/>
+              <a:t>	&lt;li&gt;courses&lt;/li&gt;</a:t>
+            </a:r>
+          </a:p>
+          <a:p>
+            <a:r>
+              <a:rPr lang="en-CA" sz="1600" dirty="0"/>
+              <a:t>+ Academic semester</a:t>
+            </a:r>
+          </a:p>
+          <a:p>
+            <a:r>
+              <a:rPr lang="en-CA" sz="1600" dirty="0"/>
+              <a:t>	&lt;li&gt;courses&lt;/li&gt;</a:t>
+            </a:r>
+          </a:p>
+          <a:p>
+            <a:r>
+              <a:rPr lang="en-CA" sz="1600" dirty="0"/>
+              <a:t>+ Academic semester</a:t>
+            </a:r>
+          </a:p>
+          <a:p>
+            <a:r>
+              <a:rPr lang="en-CA" sz="1600" dirty="0"/>
+              <a:t>	&lt;li&gt;courses&lt;/li&gt;</a:t>
             </a:r>
           </a:p>
         </p:txBody>

</xml_diff>